<commit_message>
Update Database Indexing Image
</commit_message>
<xml_diff>
--- a/images/theory_analysis/Database_Indexing/Database_Indexing.pptx
+++ b/images/theory_analysis/Database_Indexing/Database_Indexing.pptx
@@ -109,7 +109,7 @@
   </p:defaultTextStyle>
   <p:extLst>
     <p:ext uri="{EFAFB233-063F-42B5-8137-9DF3F51BA10A}">
-      <p15:sldGuideLst xmlns="" xmlns:p15="http://schemas.microsoft.com/office/powerpoint/2012/main">
+      <p15:sldGuideLst xmlns:p15="http://schemas.microsoft.com/office/powerpoint/2012/main" xmlns="">
         <p15:guide id="1" orient="horz" pos="2160">
           <p15:clr>
             <a:srgbClr val="A4A3A4"/>
@@ -208,7 +208,7 @@
           <a:p>
             <a:fld id="{6CD5550B-26C4-49A9-A5BA-636EF7BE6CE9}" type="datetimeFigureOut">
               <a:rPr lang="ko-KR" altLang="en-US" smtClean="0"/>
-              <a:t>2018-01-02</a:t>
+              <a:t>2018-01-03</a:t>
             </a:fld>
             <a:endParaRPr lang="ko-KR" altLang="en-US"/>
           </a:p>
@@ -757,7 +757,7 @@
           <a:p>
             <a:fld id="{FB30EDBD-1C2D-4C1E-B459-B60219FAB484}" type="datetimeFigureOut">
               <a:rPr lang="ko-KR" altLang="en-US" smtClean="0"/>
-              <a:t>2018-01-02</a:t>
+              <a:t>2018-01-03</a:t>
             </a:fld>
             <a:endParaRPr lang="ko-KR" altLang="en-US"/>
           </a:p>
@@ -922,7 +922,7 @@
           <a:p>
             <a:fld id="{FB30EDBD-1C2D-4C1E-B459-B60219FAB484}" type="datetimeFigureOut">
               <a:rPr lang="ko-KR" altLang="en-US" smtClean="0"/>
-              <a:t>2018-01-02</a:t>
+              <a:t>2018-01-03</a:t>
             </a:fld>
             <a:endParaRPr lang="ko-KR" altLang="en-US"/>
           </a:p>
@@ -1097,7 +1097,7 @@
           <a:p>
             <a:fld id="{FB30EDBD-1C2D-4C1E-B459-B60219FAB484}" type="datetimeFigureOut">
               <a:rPr lang="ko-KR" altLang="en-US" smtClean="0"/>
-              <a:t>2018-01-02</a:t>
+              <a:t>2018-01-03</a:t>
             </a:fld>
             <a:endParaRPr lang="ko-KR" altLang="en-US"/>
           </a:p>
@@ -1262,7 +1262,7 @@
           <a:p>
             <a:fld id="{FB30EDBD-1C2D-4C1E-B459-B60219FAB484}" type="datetimeFigureOut">
               <a:rPr lang="ko-KR" altLang="en-US" smtClean="0"/>
-              <a:t>2018-01-02</a:t>
+              <a:t>2018-01-03</a:t>
             </a:fld>
             <a:endParaRPr lang="ko-KR" altLang="en-US"/>
           </a:p>
@@ -1510,7 +1510,7 @@
           <a:p>
             <a:fld id="{FB30EDBD-1C2D-4C1E-B459-B60219FAB484}" type="datetimeFigureOut">
               <a:rPr lang="ko-KR" altLang="en-US" smtClean="0"/>
-              <a:t>2018-01-02</a:t>
+              <a:t>2018-01-03</a:t>
             </a:fld>
             <a:endParaRPr lang="ko-KR" altLang="en-US"/>
           </a:p>
@@ -1793,7 +1793,7 @@
           <a:p>
             <a:fld id="{FB30EDBD-1C2D-4C1E-B459-B60219FAB484}" type="datetimeFigureOut">
               <a:rPr lang="ko-KR" altLang="en-US" smtClean="0"/>
-              <a:t>2018-01-02</a:t>
+              <a:t>2018-01-03</a:t>
             </a:fld>
             <a:endParaRPr lang="ko-KR" altLang="en-US"/>
           </a:p>
@@ -2210,7 +2210,7 @@
           <a:p>
             <a:fld id="{FB30EDBD-1C2D-4C1E-B459-B60219FAB484}" type="datetimeFigureOut">
               <a:rPr lang="ko-KR" altLang="en-US" smtClean="0"/>
-              <a:t>2018-01-02</a:t>
+              <a:t>2018-01-03</a:t>
             </a:fld>
             <a:endParaRPr lang="ko-KR" altLang="en-US"/>
           </a:p>
@@ -2323,7 +2323,7 @@
           <a:p>
             <a:fld id="{FB30EDBD-1C2D-4C1E-B459-B60219FAB484}" type="datetimeFigureOut">
               <a:rPr lang="ko-KR" altLang="en-US" smtClean="0"/>
-              <a:t>2018-01-02</a:t>
+              <a:t>2018-01-03</a:t>
             </a:fld>
             <a:endParaRPr lang="ko-KR" altLang="en-US"/>
           </a:p>
@@ -2413,7 +2413,7 @@
           <a:p>
             <a:fld id="{FB30EDBD-1C2D-4C1E-B459-B60219FAB484}" type="datetimeFigureOut">
               <a:rPr lang="ko-KR" altLang="en-US" smtClean="0"/>
-              <a:t>2018-01-02</a:t>
+              <a:t>2018-01-03</a:t>
             </a:fld>
             <a:endParaRPr lang="ko-KR" altLang="en-US"/>
           </a:p>
@@ -2685,7 +2685,7 @@
           <a:p>
             <a:fld id="{FB30EDBD-1C2D-4C1E-B459-B60219FAB484}" type="datetimeFigureOut">
               <a:rPr lang="ko-KR" altLang="en-US" smtClean="0"/>
-              <a:t>2018-01-02</a:t>
+              <a:t>2018-01-03</a:t>
             </a:fld>
             <a:endParaRPr lang="ko-KR" altLang="en-US"/>
           </a:p>
@@ -2933,7 +2933,7 @@
           <a:p>
             <a:fld id="{FB30EDBD-1C2D-4C1E-B459-B60219FAB484}" type="datetimeFigureOut">
               <a:rPr lang="ko-KR" altLang="en-US" smtClean="0"/>
-              <a:t>2018-01-02</a:t>
+              <a:t>2018-01-03</a:t>
             </a:fld>
             <a:endParaRPr lang="ko-KR" altLang="en-US"/>
           </a:p>
@@ -3141,7 +3141,7 @@
           <a:p>
             <a:fld id="{FB30EDBD-1C2D-4C1E-B459-B60219FAB484}" type="datetimeFigureOut">
               <a:rPr lang="ko-KR" altLang="en-US" smtClean="0"/>
-              <a:t>2018-01-02</a:t>
+              <a:t>2018-01-03</a:t>
             </a:fld>
             <a:endParaRPr lang="ko-KR" altLang="en-US"/>
           </a:p>
@@ -4604,6 +4604,72 @@
           </a:fontRef>
         </p:style>
       </p:cxnSp>
+      <p:sp>
+        <p:nvSpPr>
+          <p:cNvPr id="3" name="TextBox 2"/>
+          <p:cNvSpPr txBox="1"/>
+          <p:nvPr/>
+        </p:nvSpPr>
+        <p:spPr>
+          <a:xfrm>
+            <a:off x="1948136" y="1255861"/>
+            <a:ext cx="1399728" cy="307777"/>
+          </a:xfrm>
+          <a:prstGeom prst="rect">
+            <a:avLst/>
+          </a:prstGeom>
+          <a:noFill/>
+        </p:spPr>
+        <p:txBody>
+          <a:bodyPr wrap="square" rtlCol="0">
+            <a:spAutoFit/>
+          </a:bodyPr>
+          <a:lstStyle/>
+          <a:p>
+            <a:pPr algn="ctr"/>
+            <a:r>
+              <a:rPr lang="en-US" altLang="ko-KR" sz="1400" dirty="0" smtClean="0"/>
+              <a:t>State Index</a:t>
+            </a:r>
+            <a:endParaRPr lang="ko-KR" altLang="en-US" sz="1400" dirty="0"/>
+          </a:p>
+        </p:txBody>
+      </p:sp>
+      <p:sp>
+        <p:nvSpPr>
+          <p:cNvPr id="13" name="TextBox 12"/>
+          <p:cNvSpPr txBox="1"/>
+          <p:nvPr/>
+        </p:nvSpPr>
+        <p:spPr>
+          <a:xfrm>
+            <a:off x="5179640" y="1255861"/>
+            <a:ext cx="1912640" cy="307777"/>
+          </a:xfrm>
+          <a:prstGeom prst="rect">
+            <a:avLst/>
+          </a:prstGeom>
+          <a:noFill/>
+        </p:spPr>
+        <p:txBody>
+          <a:bodyPr wrap="square" rtlCol="0">
+            <a:spAutoFit/>
+          </a:bodyPr>
+          <a:lstStyle/>
+          <a:p>
+            <a:pPr algn="ctr"/>
+            <a:r>
+              <a:rPr lang="en-US" altLang="ko-KR" sz="1400" dirty="0" err="1" smtClean="0"/>
+              <a:t>Fruit_Info</a:t>
+            </a:r>
+            <a:r>
+              <a:rPr lang="en-US" altLang="ko-KR" sz="1400" dirty="0" smtClean="0"/>
+              <a:t> Table</a:t>
+            </a:r>
+            <a:endParaRPr lang="ko-KR" altLang="en-US" sz="1400" dirty="0"/>
+          </a:p>
+        </p:txBody>
+      </p:sp>
     </p:spTree>
     <p:extLst>
       <p:ext uri="{BB962C8B-B14F-4D97-AF65-F5344CB8AC3E}">

</xml_diff>